<commit_message>
First commit with Starling UX
</commit_message>
<xml_diff>
--- a/setup/Starling.pptx
+++ b/setup/Starling.pptx
@@ -9,6 +9,7 @@
     <p:sldId id="260" r:id="rId3"/>
     <p:sldId id="258" r:id="rId4"/>
     <p:sldId id="261" r:id="rId5"/>
+    <p:sldId id="262" r:id="rId6"/>
   </p:sldIdLst>
   <p:sldSz cx="12192000" cy="6858000"/>
   <p:notesSz cx="6858000" cy="9144000"/>
@@ -341,7 +342,7 @@
           <a:p>
             <a:fld id="{D62A82C6-D4D2-48D6-8A87-6813622EBFB9}" type="datetimeFigureOut">
               <a:rPr lang="en-US" smtClean="0"/>
-              <a:t>2/24/2021</a:t>
+              <a:t>5/24/2021</a:t>
             </a:fld>
             <a:endParaRPr lang="en-US"/>
           </a:p>
@@ -549,7 +550,7 @@
           <a:p>
             <a:fld id="{D62A82C6-D4D2-48D6-8A87-6813622EBFB9}" type="datetimeFigureOut">
               <a:rPr lang="en-US" smtClean="0"/>
-              <a:t>2/24/2021</a:t>
+              <a:t>5/24/2021</a:t>
             </a:fld>
             <a:endParaRPr lang="en-US"/>
           </a:p>
@@ -805,7 +806,7 @@
           <a:p>
             <a:fld id="{D62A82C6-D4D2-48D6-8A87-6813622EBFB9}" type="datetimeFigureOut">
               <a:rPr lang="en-US" smtClean="0"/>
-              <a:t>2/24/2021</a:t>
+              <a:t>5/24/2021</a:t>
             </a:fld>
             <a:endParaRPr lang="en-US"/>
           </a:p>
@@ -979,7 +980,7 @@
           <a:p>
             <a:fld id="{D62A82C6-D4D2-48D6-8A87-6813622EBFB9}" type="datetimeFigureOut">
               <a:rPr lang="en-US" smtClean="0"/>
-              <a:t>2/24/2021</a:t>
+              <a:t>5/24/2021</a:t>
             </a:fld>
             <a:endParaRPr lang="en-US"/>
           </a:p>
@@ -1322,7 +1323,7 @@
           <a:p>
             <a:fld id="{D62A82C6-D4D2-48D6-8A87-6813622EBFB9}" type="datetimeFigureOut">
               <a:rPr lang="en-US" smtClean="0"/>
-              <a:t>2/24/2021</a:t>
+              <a:t>5/24/2021</a:t>
             </a:fld>
             <a:endParaRPr lang="en-US"/>
           </a:p>
@@ -1597,7 +1598,7 @@
           <a:p>
             <a:fld id="{D62A82C6-D4D2-48D6-8A87-6813622EBFB9}" type="datetimeFigureOut">
               <a:rPr lang="en-US" smtClean="0"/>
-              <a:t>2/24/2021</a:t>
+              <a:t>5/24/2021</a:t>
             </a:fld>
             <a:endParaRPr lang="en-US"/>
           </a:p>
@@ -1976,7 +1977,7 @@
           <a:p>
             <a:fld id="{D62A82C6-D4D2-48D6-8A87-6813622EBFB9}" type="datetimeFigureOut">
               <a:rPr lang="en-US" smtClean="0"/>
-              <a:t>2/24/2021</a:t>
+              <a:t>5/24/2021</a:t>
             </a:fld>
             <a:endParaRPr lang="en-US"/>
           </a:p>
@@ -2094,7 +2095,7 @@
           <a:p>
             <a:fld id="{D62A82C6-D4D2-48D6-8A87-6813622EBFB9}" type="datetimeFigureOut">
               <a:rPr lang="en-US" smtClean="0"/>
-              <a:t>2/24/2021</a:t>
+              <a:t>5/24/2021</a:t>
             </a:fld>
             <a:endParaRPr lang="en-US"/>
           </a:p>
@@ -2265,7 +2266,7 @@
           <a:p>
             <a:fld id="{D62A82C6-D4D2-48D6-8A87-6813622EBFB9}" type="datetimeFigureOut">
               <a:rPr lang="en-US" smtClean="0"/>
-              <a:t>2/24/2021</a:t>
+              <a:t>5/24/2021</a:t>
             </a:fld>
             <a:endParaRPr lang="en-US"/>
           </a:p>
@@ -2619,7 +2620,7 @@
           <a:p>
             <a:fld id="{D62A82C6-D4D2-48D6-8A87-6813622EBFB9}" type="datetimeFigureOut">
               <a:rPr lang="en-US" smtClean="0"/>
-              <a:t>2/24/2021</a:t>
+              <a:t>5/24/2021</a:t>
             </a:fld>
             <a:endParaRPr lang="en-US"/>
           </a:p>
@@ -3001,7 +3002,7 @@
           <a:p>
             <a:fld id="{D62A82C6-D4D2-48D6-8A87-6813622EBFB9}" type="datetimeFigureOut">
               <a:rPr lang="en-US" smtClean="0"/>
-              <a:t>2/24/2021</a:t>
+              <a:t>5/24/2021</a:t>
             </a:fld>
             <a:endParaRPr lang="en-US"/>
           </a:p>
@@ -3288,7 +3289,7 @@
           <a:p>
             <a:fld id="{D62A82C6-D4D2-48D6-8A87-6813622EBFB9}" type="datetimeFigureOut">
               <a:rPr lang="en-US" smtClean="0"/>
-              <a:t>2/24/2021</a:t>
+              <a:t>5/24/2021</a:t>
             </a:fld>
             <a:endParaRPr lang="en-US"/>
           </a:p>
@@ -8675,7 +8676,7 @@
             <a:pPr algn="ctr"/>
             <a:r>
               <a:rPr lang="en-US" sz="700" dirty="0"/>
-              <a:t>100 batches with each 60 messages are sent</a:t>
+              <a:t>100 batches x 60 msgs = 6,000 msgs are sent</a:t>
             </a:r>
           </a:p>
         </p:txBody>
@@ -10316,6 +10317,36 @@
     <p:extLst>
       <p:ext uri="{BB962C8B-B14F-4D97-AF65-F5344CB8AC3E}">
         <p14:creationId xmlns:p14="http://schemas.microsoft.com/office/powerpoint/2010/main" val="1419696244"/>
+      </p:ext>
+    </p:extLst>
+  </p:cSld>
+  <p:clrMapOvr>
+    <a:masterClrMapping/>
+  </p:clrMapOvr>
+</p:sld>
+</file>
+
+<file path=ppt/slides/slide5.xml><?xml version="1.0" encoding="utf-8"?>
+<p:sld xmlns:a="http://schemas.openxmlformats.org/drawingml/2006/main" xmlns:r="http://schemas.openxmlformats.org/officeDocument/2006/relationships" xmlns:p="http://schemas.openxmlformats.org/presentationml/2006/main">
+  <p:cSld>
+    <p:spTree>
+      <p:nvGrpSpPr>
+        <p:cNvPr id="1" name=""/>
+        <p:cNvGrpSpPr/>
+        <p:nvPr/>
+      </p:nvGrpSpPr>
+      <p:grpSpPr>
+        <a:xfrm>
+          <a:off x="0" y="0"/>
+          <a:ext cx="0" cy="0"/>
+          <a:chOff x="0" y="0"/>
+          <a:chExt cx="0" cy="0"/>
+        </a:xfrm>
+      </p:grpSpPr>
+    </p:spTree>
+    <p:extLst>
+      <p:ext uri="{BB962C8B-B14F-4D97-AF65-F5344CB8AC3E}">
+        <p14:creationId xmlns:p14="http://schemas.microsoft.com/office/powerpoint/2010/main" val="2435270530"/>
       </p:ext>
     </p:extLst>
   </p:cSld>

</xml_diff>